<commit_message>
Removed unnecessary printing, further work on presentation
</commit_message>
<xml_diff>
--- a/doc/BGP Simulator.pptx
+++ b/doc/BGP Simulator.pptx
@@ -5,7 +5,7 @@
     <p:sldMasterId id="2147483648" r:id="rId1"/>
   </p:sldMasterIdLst>
   <p:notesMasterIdLst>
-    <p:notesMasterId r:id="rId18"/>
+    <p:notesMasterId r:id="rId19"/>
   </p:notesMasterIdLst>
   <p:sldIdLst>
     <p:sldId id="256" r:id="rId2"/>
@@ -24,6 +24,7 @@
     <p:sldId id="269" r:id="rId15"/>
     <p:sldId id="270" r:id="rId16"/>
     <p:sldId id="271" r:id="rId17"/>
+    <p:sldId id="272" r:id="rId18"/>
   </p:sldIdLst>
   <p:sldSz cx="12192000" cy="6858000"/>
   <p:notesSz cx="6858000" cy="9144000"/>
@@ -163,6 +164,7 @@
           <p14:sldIdLst>
             <p14:sldId id="270"/>
             <p14:sldId id="271"/>
+            <p14:sldId id="272"/>
           </p14:sldIdLst>
         </p14:section>
       </p14:sectionLst>
@@ -2833,14 +2835,30 @@
   <p:cSld>
     <p:bg>
       <p:bgPr>
-        <a:pattFill prst="pct60">
-          <a:fgClr>
-            <a:srgbClr val="99CCFF"/>
-          </a:fgClr>
-          <a:bgClr>
-            <a:schemeClr val="bg1"/>
-          </a:bgClr>
-        </a:pattFill>
+        <a:gradFill flip="none" rotWithShape="1">
+          <a:gsLst>
+            <a:gs pos="0">
+              <a:schemeClr val="accent5">
+                <a:lumMod val="5000"/>
+                <a:lumOff val="95000"/>
+              </a:schemeClr>
+            </a:gs>
+            <a:gs pos="74000">
+              <a:schemeClr val="accent5">
+                <a:lumMod val="45000"/>
+                <a:lumOff val="55000"/>
+              </a:schemeClr>
+            </a:gs>
+            <a:gs pos="83000">
+              <a:schemeClr val="accent5">
+                <a:lumMod val="45000"/>
+                <a:lumOff val="55000"/>
+              </a:schemeClr>
+            </a:gs>
+          </a:gsLst>
+          <a:lin ang="5400000" scaled="1"/>
+          <a:tileRect/>
+        </a:gradFill>
         <a:effectLst/>
       </p:bgPr>
     </p:bg>
@@ -3669,7 +3687,7 @@
         <p:spPr/>
         <p:txBody>
           <a:bodyPr>
-            <a:normAutofit lnSpcReduction="10000"/>
+            <a:normAutofit fontScale="92500" lnSpcReduction="10000"/>
           </a:bodyPr>
           <a:lstStyle/>
           <a:p>
@@ -3702,7 +3720,6 @@
             </a:pPr>
             <a:r>
               <a:rPr lang="en-GB" dirty="0">
-                <a:latin typeface="CMU Typewriter Text" panose="02000609000000000000" pitchFamily="49" charset="0"/>
                 <a:ea typeface="CMU Typewriter Text" panose="02000609000000000000" pitchFamily="49" charset="0"/>
                 <a:cs typeface="CMU Typewriter Text" panose="02000609000000000000" pitchFamily="49" charset="0"/>
               </a:rPr>
@@ -3710,15 +3727,14 @@
             </a:r>
             <a:r>
               <a:rPr lang="en-GB" dirty="0" err="1">
-                <a:latin typeface="CMU Typewriter Text" panose="02000609000000000000" pitchFamily="49" charset="0"/>
-                <a:ea typeface="CMU Typewriter Text" panose="02000609000000000000" pitchFamily="49" charset="0"/>
-                <a:cs typeface="CMU Typewriter Text" panose="02000609000000000000" pitchFamily="49" charset="0"/>
+                <a:latin typeface="CMU Typewriter Text" panose="02000309000000000000" pitchFamily="50" charset="0"/>
+                <a:ea typeface="CMU Typewriter Text" panose="02000309000000000000" pitchFamily="50" charset="0"/>
+                <a:cs typeface="CMU Typewriter Text" panose="02000309000000000000" pitchFamily="50" charset="0"/>
               </a:rPr>
               <a:t>InterRouterInterfaces</a:t>
             </a:r>
             <a:r>
               <a:rPr lang="en-GB" dirty="0">
-                <a:latin typeface="CMU Typewriter Text" panose="02000609000000000000" pitchFamily="49" charset="0"/>
                 <a:ea typeface="CMU Typewriter Text" panose="02000609000000000000" pitchFamily="49" charset="0"/>
                 <a:cs typeface="CMU Typewriter Text" panose="02000609000000000000" pitchFamily="49" charset="0"/>
               </a:rPr>
@@ -3732,7 +3748,6 @@
             </a:pPr>
             <a:r>
               <a:rPr lang="en-GB" dirty="0">
-                <a:latin typeface="CMU Typewriter Text" panose="02000609000000000000" pitchFamily="49" charset="0"/>
                 <a:ea typeface="CMU Typewriter Text" panose="02000609000000000000" pitchFamily="49" charset="0"/>
                 <a:cs typeface="CMU Typewriter Text" panose="02000609000000000000" pitchFamily="49" charset="0"/>
               </a:rPr>
@@ -4356,9 +4371,9 @@
             </a:r>
             <a:r>
               <a:rPr lang="en-GB" dirty="0">
-                <a:latin typeface="CMU Typewriter Text" panose="02000609000000000000" pitchFamily="49" charset="0"/>
-                <a:ea typeface="CMU Typewriter Text" panose="02000609000000000000" pitchFamily="49" charset="0"/>
-                <a:cs typeface="CMU Typewriter Text" panose="02000609000000000000" pitchFamily="49" charset="0"/>
+                <a:latin typeface="CMU Typewriter Text" panose="02000309000000000000" pitchFamily="50" charset="0"/>
+                <a:ea typeface="CMU Typewriter Text" panose="02000309000000000000" pitchFamily="50" charset="0"/>
+                <a:cs typeface="CMU Typewriter Text" panose="02000309000000000000" pitchFamily="50" charset="0"/>
               </a:rPr>
               <a:t>AS_PATH</a:t>
             </a:r>
@@ -4493,70 +4508,187 @@
           </a:p>
         </p:txBody>
       </p:sp>
-      <p:sp>
-        <p:nvSpPr>
-          <p:cNvPr id="3" name="Content Placeholder 2"/>
-          <p:cNvSpPr>
-            <a:spLocks noGrp="1"/>
-          </p:cNvSpPr>
-          <p:nvPr>
-            <p:ph idx="1"/>
-          </p:nvPr>
-        </p:nvSpPr>
-        <p:spPr/>
-        <p:txBody>
-          <a:bodyPr/>
-          <a:lstStyle/>
-          <a:p>
-            <a:r>
-              <a:rPr lang="en-GB" dirty="0"/>
-              <a:t>Each router holds two trust values for each neighbour: inherent trust and voted trust</a:t>
-            </a:r>
-          </a:p>
-          <a:p>
-            <a:r>
-              <a:rPr lang="en-GB" dirty="0"/>
-              <a:t>Stored as values in range -128..127 for easier transmission, scaled to 0..1 when used for path scaling</a:t>
-            </a:r>
-          </a:p>
-          <a:p>
-            <a:r>
-              <a:rPr lang="en-GB" i="1" dirty="0"/>
-              <a:t>Normalized routing criterion with trust rate</a:t>
-            </a:r>
-            <a:r>
-              <a:rPr lang="en-GB" dirty="0"/>
-              <a:t> scaled similarly to He’s solution</a:t>
-            </a:r>
-            <a:r>
-              <a:rPr lang="en-GB" baseline="40000" dirty="0"/>
-              <a:t>1</a:t>
-            </a:r>
-            <a:r>
-              <a:rPr lang="en-GB" dirty="0"/>
-              <a:t>: scaled cost = initial cost / trust rate</a:t>
-            </a:r>
-          </a:p>
-          <a:p>
-            <a:r>
-              <a:rPr lang="en-GB" dirty="0"/>
-              <a:t>Trust rate is the weighted average of inherent and voted trust</a:t>
-            </a:r>
-          </a:p>
-          <a:p>
-            <a:r>
-              <a:rPr lang="en-GB" dirty="0"/>
-              <a:t>Voted trust is the average of received votes on the neighbour</a:t>
-            </a:r>
-          </a:p>
-          <a:p>
-            <a:r>
-              <a:rPr lang="en-GB" dirty="0"/>
-              <a:t>Inherent trust is specified by operator and neighbour behaviour</a:t>
-            </a:r>
-          </a:p>
-        </p:txBody>
-      </p:sp>
+      <mc:AlternateContent xmlns:mc="http://schemas.openxmlformats.org/markup-compatibility/2006" xmlns:a14="http://schemas.microsoft.com/office/drawing/2010/main">
+        <mc:Choice Requires="a14">
+          <p:sp>
+            <p:nvSpPr>
+              <p:cNvPr id="3" name="Content Placeholder 2"/>
+              <p:cNvSpPr>
+                <a:spLocks noGrp="1"/>
+              </p:cNvSpPr>
+              <p:nvPr>
+                <p:ph idx="1"/>
+              </p:nvPr>
+            </p:nvSpPr>
+            <p:spPr/>
+            <p:txBody>
+              <a:bodyPr>
+                <a:normAutofit lnSpcReduction="10000"/>
+              </a:bodyPr>
+              <a:lstStyle/>
+              <a:p>
+                <a:r>
+                  <a:rPr lang="en-GB" dirty="0"/>
+                  <a:t>Each router holds two trust values for each neighbour: inherent trust and voted trust</a:t>
+                </a:r>
+              </a:p>
+              <a:p>
+                <a:r>
+                  <a:rPr lang="en-GB" dirty="0"/>
+                  <a:t>Stored as values in range -128..127 for easier transmission, scaled to 0..1 when used for path cost calculations</a:t>
+                </a:r>
+              </a:p>
+              <a:p>
+                <a:r>
+                  <a:rPr lang="en-GB" i="1" dirty="0"/>
+                  <a:t>Normalized routing criterion with trust rate</a:t>
+                </a:r>
+                <a:r>
+                  <a:rPr lang="en-GB" dirty="0"/>
+                  <a:t> calculated similarly to He’s solution</a:t>
+                </a:r>
+                <a:r>
+                  <a:rPr lang="en-GB" baseline="40000" dirty="0"/>
+                  <a:t>1</a:t>
+                </a:r>
+                <a:r>
+                  <a:rPr lang="en-GB" dirty="0"/>
+                  <a:t>: </a:t>
+                </a:r>
+                <a14:m>
+                  <m:oMath xmlns:m="http://schemas.openxmlformats.org/officeDocument/2006/math">
+                    <m:r>
+                      <a:rPr lang="en-GB" b="0" i="1" smtClean="0">
+                        <a:latin typeface="Cambria Math" panose="02040503050406030204" pitchFamily="18" charset="0"/>
+                      </a:rPr>
+                      <m:t>𝑠𝑐𝑎𝑙𝑒𝑑</m:t>
+                    </m:r>
+                    <m:r>
+                      <a:rPr lang="en-GB" b="0" i="1" smtClean="0">
+                        <a:latin typeface="Cambria Math" panose="02040503050406030204" pitchFamily="18" charset="0"/>
+                      </a:rPr>
+                      <m:t> </m:t>
+                    </m:r>
+                    <m:r>
+                      <a:rPr lang="en-GB" b="0" i="1" smtClean="0">
+                        <a:latin typeface="Cambria Math" panose="02040503050406030204" pitchFamily="18" charset="0"/>
+                      </a:rPr>
+                      <m:t>𝑐𝑜𝑠𝑡</m:t>
+                    </m:r>
+                    <m:r>
+                      <a:rPr lang="en-GB" b="0" i="1" smtClean="0">
+                        <a:latin typeface="Cambria Math" panose="02040503050406030204" pitchFamily="18" charset="0"/>
+                      </a:rPr>
+                      <m:t>= </m:t>
+                    </m:r>
+                    <m:f>
+                      <m:fPr>
+                        <m:ctrlPr>
+                          <a:rPr lang="en-GB" b="0" i="1" smtClean="0">
+                            <a:latin typeface="Cambria Math" panose="02040503050406030204" pitchFamily="18" charset="0"/>
+                          </a:rPr>
+                        </m:ctrlPr>
+                      </m:fPr>
+                      <m:num>
+                        <m:r>
+                          <a:rPr lang="en-GB" b="0" i="1" smtClean="0">
+                            <a:latin typeface="Cambria Math" panose="02040503050406030204" pitchFamily="18" charset="0"/>
+                          </a:rPr>
+                          <m:t>𝑖𝑛𝑖𝑡𝑖𝑎𝑙</m:t>
+                        </m:r>
+                        <m:r>
+                          <a:rPr lang="en-GB" b="0" i="1" smtClean="0">
+                            <a:latin typeface="Cambria Math" panose="02040503050406030204" pitchFamily="18" charset="0"/>
+                          </a:rPr>
+                          <m:t> </m:t>
+                        </m:r>
+                        <m:r>
+                          <a:rPr lang="en-GB" b="0" i="1" smtClean="0">
+                            <a:latin typeface="Cambria Math" panose="02040503050406030204" pitchFamily="18" charset="0"/>
+                          </a:rPr>
+                          <m:t>𝑐𝑜𝑠𝑡</m:t>
+                        </m:r>
+                      </m:num>
+                      <m:den>
+                        <m:r>
+                          <a:rPr lang="en-GB" b="0" i="1" smtClean="0">
+                            <a:latin typeface="Cambria Math" panose="02040503050406030204" pitchFamily="18" charset="0"/>
+                          </a:rPr>
+                          <m:t>𝑡𝑟𝑢𝑠𝑡</m:t>
+                        </m:r>
+                        <m:r>
+                          <a:rPr lang="en-GB" b="0" i="1" smtClean="0">
+                            <a:latin typeface="Cambria Math" panose="02040503050406030204" pitchFamily="18" charset="0"/>
+                          </a:rPr>
+                          <m:t> </m:t>
+                        </m:r>
+                        <m:r>
+                          <a:rPr lang="en-GB" b="0" i="1" smtClean="0">
+                            <a:latin typeface="Cambria Math" panose="02040503050406030204" pitchFamily="18" charset="0"/>
+                          </a:rPr>
+                          <m:t>𝑟𝑎𝑡𝑒</m:t>
+                        </m:r>
+                      </m:den>
+                    </m:f>
+                  </m:oMath>
+                </a14:m>
+                <a:endParaRPr lang="en-GB" dirty="0"/>
+              </a:p>
+              <a:p>
+                <a:r>
+                  <a:rPr lang="en-GB" dirty="0"/>
+                  <a:t>Trust rate is the weighted average of inherent and voted trust</a:t>
+                </a:r>
+              </a:p>
+              <a:p>
+                <a:r>
+                  <a:rPr lang="en-GB" dirty="0"/>
+                  <a:t>Voted trust is the average of received votes on the neighbour</a:t>
+                </a:r>
+              </a:p>
+              <a:p>
+                <a:r>
+                  <a:rPr lang="en-GB" dirty="0"/>
+                  <a:t>Inherent trust is specified by operator and neighbour behaviour</a:t>
+                </a:r>
+              </a:p>
+            </p:txBody>
+          </p:sp>
+        </mc:Choice>
+        <mc:Fallback xmlns="">
+          <p:sp>
+            <p:nvSpPr>
+              <p:cNvPr id="3" name="Content Placeholder 2"/>
+              <p:cNvSpPr>
+                <a:spLocks noGrp="1" noRot="1" noChangeAspect="1" noMove="1" noResize="1" noEditPoints="1" noAdjustHandles="1" noChangeArrowheads="1" noChangeShapeType="1" noTextEdit="1"/>
+              </p:cNvSpPr>
+              <p:nvPr>
+                <p:ph idx="1"/>
+              </p:nvPr>
+            </p:nvSpPr>
+            <p:spPr>
+              <a:blipFill>
+                <a:blip r:embed="rId2"/>
+                <a:stretch>
+                  <a:fillRect l="-1043" t="-3361" r="-1913"/>
+                </a:stretch>
+              </a:blipFill>
+            </p:spPr>
+            <p:txBody>
+              <a:bodyPr/>
+              <a:lstStyle/>
+              <a:p>
+                <a:r>
+                  <a:rPr lang="fi-FI">
+                    <a:noFill/>
+                  </a:rPr>
+                  <a:t> </a:t>
+                </a:r>
+              </a:p>
+            </p:txBody>
+          </p:sp>
+        </mc:Fallback>
+      </mc:AlternateContent>
       <p:sp>
         <p:nvSpPr>
           <p:cNvPr id="4" name="Footer Placeholder 3"/>
@@ -4648,13 +4780,32 @@
           <a:p>
             <a:r>
               <a:rPr lang="en-GB" dirty="0"/>
-              <a:t>Voting is done via specific TRUST messages</a:t>
-            </a:r>
-          </a:p>
-          <a:p>
-            <a:r>
-              <a:rPr lang="en-GB" dirty="0"/>
-              <a:t>Messages consist of a flag specifying if they are vote requests or responses, voted ID and target ID. If the vote is a response, the message also contains the vote, encrypted with 1024-bit RSA, and a signature. Keys are provided by the global state.</a:t>
+              <a:t>Voting is done via specific </a:t>
+            </a:r>
+            <a:r>
+              <a:rPr lang="en-GB" dirty="0">
+                <a:latin typeface="CMU Typewriter Text" panose="02000309000000000000" pitchFamily="50" charset="0"/>
+                <a:ea typeface="CMU Typewriter Text" panose="02000309000000000000" pitchFamily="50" charset="0"/>
+                <a:cs typeface="CMU Typewriter Text" panose="02000309000000000000" pitchFamily="50" charset="0"/>
+              </a:rPr>
+              <a:t>TRUST</a:t>
+            </a:r>
+            <a:r>
+              <a:rPr lang="en-GB" dirty="0"/>
+              <a:t> messages</a:t>
+            </a:r>
+          </a:p>
+          <a:p>
+            <a:pPr lvl="1"/>
+            <a:r>
+              <a:rPr lang="en-GB" dirty="0"/>
+              <a:t>As no BGP session to the voter is established, the messages are not BGP messages per se, but should be considered as ordinary UDP datagrams</a:t>
+            </a:r>
+          </a:p>
+          <a:p>
+            <a:r>
+              <a:rPr lang="en-GB" dirty="0"/>
+              <a:t>Messages consist of a flag specifying if they are vote requests or responses, voted ID and target ID. If the vote is a response, the message also contains the vote (encrypted using 1024-bit RSA), and a signature. Public keys are provided by the global state.</a:t>
             </a:r>
           </a:p>
         </p:txBody>
@@ -4663,6 +4814,140 @@
     <p:extLst>
       <p:ext uri="{BB962C8B-B14F-4D97-AF65-F5344CB8AC3E}">
         <p14:creationId xmlns:p14="http://schemas.microsoft.com/office/powerpoint/2010/main" val="1778181020"/>
+      </p:ext>
+    </p:extLst>
+  </p:cSld>
+  <p:clrMapOvr>
+    <a:masterClrMapping/>
+  </p:clrMapOvr>
+</p:sld>
+</file>
+
+<file path=ppt/slides/slide17.xml><?xml version="1.0" encoding="utf-8"?>
+<p:sld xmlns:a="http://schemas.openxmlformats.org/drawingml/2006/main" xmlns:r="http://schemas.openxmlformats.org/officeDocument/2006/relationships" xmlns:p="http://schemas.openxmlformats.org/presentationml/2006/main">
+  <p:cSld>
+    <p:spTree>
+      <p:nvGrpSpPr>
+        <p:cNvPr id="1" name=""/>
+        <p:cNvGrpSpPr/>
+        <p:nvPr/>
+      </p:nvGrpSpPr>
+      <p:grpSpPr>
+        <a:xfrm>
+          <a:off x="0" y="0"/>
+          <a:ext cx="0" cy="0"/>
+          <a:chOff x="0" y="0"/>
+          <a:chExt cx="0" cy="0"/>
+        </a:xfrm>
+      </p:grpSpPr>
+      <p:sp>
+        <p:nvSpPr>
+          <p:cNvPr id="2" name="Title 1"/>
+          <p:cNvSpPr>
+            <a:spLocks noGrp="1"/>
+          </p:cNvSpPr>
+          <p:nvPr>
+            <p:ph type="title"/>
+          </p:nvPr>
+        </p:nvSpPr>
+        <p:spPr/>
+        <p:txBody>
+          <a:bodyPr/>
+          <a:lstStyle/>
+          <a:p>
+            <a:r>
+              <a:rPr lang="en-GB" dirty="0"/>
+              <a:t>Trust implementation – Voting</a:t>
+            </a:r>
+          </a:p>
+        </p:txBody>
+      </p:sp>
+      <p:sp>
+        <p:nvSpPr>
+          <p:cNvPr id="3" name="Content Placeholder 2"/>
+          <p:cNvSpPr>
+            <a:spLocks noGrp="1"/>
+          </p:cNvSpPr>
+          <p:nvPr>
+            <p:ph idx="1"/>
+          </p:nvPr>
+        </p:nvSpPr>
+        <p:spPr/>
+        <p:txBody>
+          <a:bodyPr/>
+          <a:lstStyle/>
+          <a:p>
+            <a:r>
+              <a:rPr lang="en-GB" dirty="0"/>
+              <a:t>Voting is triggered by </a:t>
+            </a:r>
+            <a:r>
+              <a:rPr lang="en-GB" dirty="0">
+                <a:latin typeface="CMU Typewriter Text" panose="02000309000000000000" pitchFamily="50" charset="0"/>
+                <a:ea typeface="CMU Typewriter Text" panose="02000309000000000000" pitchFamily="50" charset="0"/>
+                <a:cs typeface="CMU Typewriter Text" panose="02000309000000000000" pitchFamily="50" charset="0"/>
+              </a:rPr>
+              <a:t>UPDATE</a:t>
+            </a:r>
+            <a:r>
+              <a:rPr lang="en-GB" dirty="0"/>
+              <a:t> messages with more than one host in the </a:t>
+            </a:r>
+            <a:r>
+              <a:rPr lang="en-GB" dirty="0">
+                <a:latin typeface="CMU Typewriter Text" panose="02000309000000000000" pitchFamily="50" charset="0"/>
+                <a:ea typeface="CMU Typewriter Text" panose="02000309000000000000" pitchFamily="50" charset="0"/>
+                <a:cs typeface="CMU Typewriter Text" panose="02000309000000000000" pitchFamily="50" charset="0"/>
+              </a:rPr>
+              <a:t>AS_PATH</a:t>
+            </a:r>
+          </a:p>
+          <a:p>
+            <a:pPr lvl="1"/>
+            <a:r>
+              <a:rPr lang="en-GB" dirty="0"/>
+              <a:t>A vote request is sent to the second-order neighbour in the </a:t>
+            </a:r>
+            <a:r>
+              <a:rPr lang="en-GB" dirty="0">
+                <a:latin typeface="CMU Typewriter Text" panose="02000309000000000000" pitchFamily="50" charset="0"/>
+                <a:ea typeface="CMU Typewriter Text" panose="02000309000000000000" pitchFamily="50" charset="0"/>
+                <a:cs typeface="CMU Typewriter Text" panose="02000309000000000000" pitchFamily="50" charset="0"/>
+              </a:rPr>
+              <a:t>AS_PATH</a:t>
+            </a:r>
+            <a:r>
+              <a:rPr lang="en-GB" dirty="0"/>
+              <a:t> list and a token is stored to ensure only one vote per request is accepted</a:t>
+            </a:r>
+          </a:p>
+          <a:p>
+            <a:pPr lvl="1"/>
+            <a:r>
+              <a:rPr lang="en-GB" dirty="0"/>
+              <a:t>The second-order neighbour responds by taking the trust value, padding the single-byte vote with random bits to avoid brute-force attacks, encrypts the vote using requester’s public key, signs the encrypted vote with own private key and sends the response back</a:t>
+            </a:r>
+          </a:p>
+          <a:p>
+            <a:pPr lvl="1"/>
+            <a:r>
+              <a:rPr lang="en-GB" dirty="0"/>
+              <a:t>The original requester checks that the token has not yet been used, validates the signature and decrypts the payload</a:t>
+            </a:r>
+          </a:p>
+          <a:p>
+            <a:pPr lvl="1"/>
+            <a:r>
+              <a:rPr lang="en-GB" dirty="0"/>
+              <a:t>Extracted trust value is then calculated to the averaged voted trust</a:t>
+            </a:r>
+          </a:p>
+        </p:txBody>
+      </p:sp>
+    </p:spTree>
+    <p:extLst>
+      <p:ext uri="{BB962C8B-B14F-4D97-AF65-F5344CB8AC3E}">
+        <p14:creationId xmlns:p14="http://schemas.microsoft.com/office/powerpoint/2010/main" val="3883766071"/>
       </p:ext>
     </p:extLst>
   </p:cSld>
@@ -4753,12 +5038,6 @@
             <a:r>
               <a:rPr lang="en-GB" dirty="0"/>
               <a:t>Trust implementation</a:t>
-            </a:r>
-          </a:p>
-          <a:p>
-            <a:r>
-              <a:rPr lang="en-GB" dirty="0"/>
-              <a:t>Topics for future development</a:t>
             </a:r>
           </a:p>
         </p:txBody>
@@ -5134,50 +5413,64 @@
           <a:chExt cx="0" cy="0"/>
         </a:xfrm>
       </p:grpSpPr>
-      <p:sp>
-        <p:nvSpPr>
-          <p:cNvPr id="2" name="Title 1"/>
-          <p:cNvSpPr>
-            <a:spLocks noGrp="1"/>
-          </p:cNvSpPr>
-          <p:nvPr>
-            <p:ph type="title"/>
-          </p:nvPr>
-        </p:nvSpPr>
-        <p:spPr/>
-        <p:txBody>
-          <a:bodyPr/>
-          <a:lstStyle/>
-          <a:p>
-            <a:r>
-              <a:rPr lang="en-GB" dirty="0"/>
-              <a:t>Program architecture</a:t>
-            </a:r>
-          </a:p>
-        </p:txBody>
-      </p:sp>
-      <p:sp>
-        <p:nvSpPr>
-          <p:cNvPr id="3" name="Content Placeholder 2"/>
-          <p:cNvSpPr>
-            <a:spLocks noGrp="1"/>
-          </p:cNvSpPr>
+      <p:graphicFrame>
+        <p:nvGraphicFramePr>
+          <p:cNvPr id="13" name="Content Placeholder 12"/>
+          <p:cNvGraphicFramePr>
+            <a:graphicFrameLocks noGrp="1" noChangeAspect="1"/>
+          </p:cNvGraphicFramePr>
           <p:nvPr>
             <p:ph idx="1"/>
-          </p:nvPr>
-        </p:nvSpPr>
-        <p:spPr/>
-        <p:txBody>
-          <a:bodyPr/>
-          <a:lstStyle/>
-          <a:p>
-            <a:r>
-              <a:rPr lang="en-GB" dirty="0"/>
-              <a:t>UML HERE</a:t>
-            </a:r>
-          </a:p>
-        </p:txBody>
-      </p:sp>
+            <p:extLst>
+              <p:ext uri="{D42A27DB-BD31-4B8C-83A1-F6EECF244321}">
+                <p14:modId xmlns:p14="http://schemas.microsoft.com/office/powerpoint/2010/main" val="256778321"/>
+              </p:ext>
+            </p:extLst>
+          </p:nvPr>
+        </p:nvGraphicFramePr>
+        <p:xfrm>
+          <a:off x="189276" y="491828"/>
+          <a:ext cx="11820982" cy="6008032"/>
+        </p:xfrm>
+        <a:graphic>
+          <a:graphicData uri="http://schemas.openxmlformats.org/presentationml/2006/ole">
+            <mc:AlternateContent xmlns:mc="http://schemas.openxmlformats.org/markup-compatibility/2006">
+              <mc:Choice xmlns:v="urn:schemas-microsoft-com:vml" Requires="v">
+                <p:oleObj spid="_x0000_s1028" name="Visio" r:id="rId3" imgW="11157416" imgH="5670096" progId="Visio.Drawing.15">
+                  <p:embed/>
+                </p:oleObj>
+              </mc:Choice>
+              <mc:Fallback>
+                <p:oleObj name="Visio" r:id="rId3" imgW="11157416" imgH="5670096" progId="Visio.Drawing.15">
+                  <p:embed/>
+                  <p:pic>
+                    <p:nvPicPr>
+                      <p:cNvPr id="0" name=""/>
+                      <p:cNvPicPr/>
+                      <p:nvPr/>
+                    </p:nvPicPr>
+                    <p:blipFill>
+                      <a:blip r:embed="rId4"/>
+                      <a:stretch>
+                        <a:fillRect/>
+                      </a:stretch>
+                    </p:blipFill>
+                    <p:spPr>
+                      <a:xfrm>
+                        <a:off x="189276" y="491828"/>
+                        <a:ext cx="11820982" cy="6008032"/>
+                      </a:xfrm>
+                      <a:prstGeom prst="rect">
+                        <a:avLst/>
+                      </a:prstGeom>
+                    </p:spPr>
+                  </p:pic>
+                </p:oleObj>
+              </mc:Fallback>
+            </mc:AlternateContent>
+          </a:graphicData>
+        </a:graphic>
+      </p:graphicFrame>
     </p:spTree>
     <p:extLst>
       <p:ext uri="{BB962C8B-B14F-4D97-AF65-F5344CB8AC3E}">

</xml_diff>